<commit_message>
Using internal column widths in pptx writer tables
The table writer used to only divide all available width evenly
for all columns. In this update the code uses the incoming widths
if they are available. If they are not set the earlier even
distribution is used. Some of the golden templates are adjusted
slightly because of different rounding when using the new
calculation model.
</commit_message>
<xml_diff>
--- a/test/pptx/comparison/both-columns/templated.pptx
+++ b/test/pptx/comparison/both-columns/templated.pptx
@@ -5744,7 +5744,7 @@
           <a:bodyPr/>
           <a:lstStyle/>
           <a:p>
-            <a:pPr lvl="0" marL="0" indent="0">
+            <a:pPr lvl="0" indent="0" marL="0">
               <a:buNone/>
             </a:pPr>
             <a:r>
@@ -5769,7 +5769,7 @@
           <a:bodyPr/>
           <a:lstStyle/>
           <a:p>
-            <a:pPr lvl="0" marL="0" indent="0">
+            <a:pPr lvl="0" indent="0" marL="0">
               <a:buNone/>
             </a:pPr>
             <a:r>
@@ -5800,8 +5800,8 @@
                 <a:tableStyleId>{5C22544A-7EE6-4342-B048-85BDC9FD1C3A}</a:tableStyleId>
               </a:tblPr>
               <a:tblGrid>
-                <a:gridCol w="2501900"/>
-                <a:gridCol w="2501900"/>
+                <a:gridCol w="2514600"/>
+                <a:gridCol w="2514600"/>
               </a:tblGrid>
               <a:tr h="0">
                 <a:tc>
@@ -5809,7 +5809,7 @@
                     <a:bodyPr/>
                     <a:lstStyle/>
                     <a:p>
-                      <a:pPr lvl="0" marL="0" indent="0">
+                      <a:pPr lvl="0" indent="0" marL="0">
                         <a:buNone/>
                       </a:pPr>
                       <a:r>
@@ -5824,7 +5824,7 @@
                     <a:bodyPr/>
                     <a:lstStyle/>
                     <a:p>
-                      <a:pPr lvl="0" marL="0" indent="0">
+                      <a:pPr lvl="0" indent="0" marL="0">
                         <a:buNone/>
                       </a:pPr>
                       <a:r>
@@ -5854,7 +5854,7 @@
           <a:bodyPr/>
           <a:lstStyle/>
           <a:p>
-            <a:pPr lvl="0" marL="0" indent="0">
+            <a:pPr lvl="0" indent="0" marL="0">
               <a:buNone/>
             </a:pPr>
             <a:r>
@@ -5879,7 +5879,7 @@
           <a:bodyPr/>
           <a:lstStyle/>
           <a:p>
-            <a:pPr lvl="0" marL="0" indent="0">
+            <a:pPr lvl="0" indent="0" marL="0">
               <a:buNone/>
             </a:pPr>
             <a:r>
@@ -5939,7 +5939,7 @@
           <a:bodyPr/>
           <a:lstStyle/>
           <a:p>
-            <a:pPr lvl="0" marL="0" indent="0" algn="ctr">
+            <a:pPr lvl="0" indent="0" marL="0" algn="ctr">
               <a:buNone/>
             </a:pPr>
             <a:r>

</xml_diff>

<commit_message>
Using internal column widths in pptx writer tables (#9392)
The table writer used to only divide all available width evenly
for all columns. In this update the code uses the incoming widths
if they are available. If they are not set the earlier even
distribution is used. Some of the golden templates are adjusted
slightly because of different rounding when using the new
calculation model.

Closes #5706
</commit_message>
<xml_diff>
--- a/test/pptx/comparison/both-columns/templated.pptx
+++ b/test/pptx/comparison/both-columns/templated.pptx
@@ -5744,7 +5744,7 @@
           <a:bodyPr/>
           <a:lstStyle/>
           <a:p>
-            <a:pPr lvl="0" marL="0" indent="0">
+            <a:pPr lvl="0" indent="0" marL="0">
               <a:buNone/>
             </a:pPr>
             <a:r>
@@ -5769,7 +5769,7 @@
           <a:bodyPr/>
           <a:lstStyle/>
           <a:p>
-            <a:pPr lvl="0" marL="0" indent="0">
+            <a:pPr lvl="0" indent="0" marL="0">
               <a:buNone/>
             </a:pPr>
             <a:r>
@@ -5800,8 +5800,8 @@
                 <a:tableStyleId>{5C22544A-7EE6-4342-B048-85BDC9FD1C3A}</a:tableStyleId>
               </a:tblPr>
               <a:tblGrid>
-                <a:gridCol w="2501900"/>
-                <a:gridCol w="2501900"/>
+                <a:gridCol w="2514600"/>
+                <a:gridCol w="2514600"/>
               </a:tblGrid>
               <a:tr h="0">
                 <a:tc>
@@ -5809,7 +5809,7 @@
                     <a:bodyPr/>
                     <a:lstStyle/>
                     <a:p>
-                      <a:pPr lvl="0" marL="0" indent="0">
+                      <a:pPr lvl="0" indent="0" marL="0">
                         <a:buNone/>
                       </a:pPr>
                       <a:r>
@@ -5824,7 +5824,7 @@
                     <a:bodyPr/>
                     <a:lstStyle/>
                     <a:p>
-                      <a:pPr lvl="0" marL="0" indent="0">
+                      <a:pPr lvl="0" indent="0" marL="0">
                         <a:buNone/>
                       </a:pPr>
                       <a:r>
@@ -5854,7 +5854,7 @@
           <a:bodyPr/>
           <a:lstStyle/>
           <a:p>
-            <a:pPr lvl="0" marL="0" indent="0">
+            <a:pPr lvl="0" indent="0" marL="0">
               <a:buNone/>
             </a:pPr>
             <a:r>
@@ -5879,7 +5879,7 @@
           <a:bodyPr/>
           <a:lstStyle/>
           <a:p>
-            <a:pPr lvl="0" marL="0" indent="0">
+            <a:pPr lvl="0" indent="0" marL="0">
               <a:buNone/>
             </a:pPr>
             <a:r>
@@ -5939,7 +5939,7 @@
           <a:bodyPr/>
           <a:lstStyle/>
           <a:p>
-            <a:pPr lvl="0" marL="0" indent="0" algn="ctr">
+            <a:pPr lvl="0" indent="0" marL="0" algn="ctr">
               <a:buNone/>
             </a:pPr>
             <a:r>

</xml_diff>